<commit_message>
done lstm part 1
</commit_message>
<xml_diff>
--- a/posts_media/2023-03-05-lstm-from-theory-to-python/lstm_diagram.pptx
+++ b/posts_media/2023-03-05-lstm-from-theory-to-python/lstm_diagram.pptx
@@ -104,6 +104,11 @@
       </a:defRPr>
     </a:lvl9pPr>
   </p:defaultTextStyle>
+  <p:extLst>
+    <p:ext uri="{EFAFB233-063F-42B5-8137-9DF3F51BA10A}">
+      <p15:sldGuideLst xmlns:p15="http://schemas.microsoft.com/office/powerpoint/2012/main"/>
+    </p:ext>
+  </p:extLst>
 </p:presentation>
 </file>
 
@@ -3336,13 +3341,13 @@
           <p:nvPr>
             <p:extLst>
               <p:ext uri="{D42A27DB-BD31-4B8C-83A1-F6EECF244321}">
-                <p14:modId xmlns:p14="http://schemas.microsoft.com/office/powerpoint/2010/main" val="1411377302"/>
+                <p14:modId xmlns:p14="http://schemas.microsoft.com/office/powerpoint/2010/main" val="703015692"/>
               </p:ext>
             </p:extLst>
           </p:nvPr>
         </p:nvGraphicFramePr>
         <p:xfrm>
-          <a:off x="4830921" y="4804470"/>
+          <a:off x="4402658" y="4702937"/>
           <a:ext cx="937444" cy="544326"/>
         </p:xfrm>
         <a:graphic>
@@ -3612,7 +3617,7 @@
         </p:nvSpPr>
         <p:spPr>
           <a:xfrm>
-            <a:off x="4533453" y="4804470"/>
+            <a:off x="4105190" y="4702937"/>
             <a:ext cx="184347" cy="544326"/>
           </a:xfrm>
           <a:prstGeom prst="leftBrace">
@@ -3664,7 +3669,7 @@
         </p:nvSpPr>
         <p:spPr>
           <a:xfrm rot="16200000">
-            <a:off x="5207470" y="5048624"/>
+            <a:off x="4779207" y="4947091"/>
             <a:ext cx="184347" cy="937444"/>
           </a:xfrm>
           <a:prstGeom prst="leftBrace">
@@ -3719,7 +3724,7 @@
         </p:nvSpPr>
         <p:spPr>
           <a:xfrm>
-            <a:off x="4245239" y="4891967"/>
+            <a:off x="3816976" y="4790434"/>
             <a:ext cx="202842" cy="369332"/>
           </a:xfrm>
           <a:prstGeom prst="rect">
@@ -3757,7 +3762,7 @@
         </p:nvSpPr>
         <p:spPr>
           <a:xfrm>
-            <a:off x="5144614" y="5542842"/>
+            <a:off x="4716351" y="5441309"/>
             <a:ext cx="202842" cy="369332"/>
           </a:xfrm>
           <a:prstGeom prst="rect">
@@ -3796,13 +3801,13 @@
           <p:nvPr>
             <p:extLst>
               <p:ext uri="{D42A27DB-BD31-4B8C-83A1-F6EECF244321}">
-                <p14:modId xmlns:p14="http://schemas.microsoft.com/office/powerpoint/2010/main" val="1971125382"/>
+                <p14:modId xmlns:p14="http://schemas.microsoft.com/office/powerpoint/2010/main" val="1145649"/>
               </p:ext>
             </p:extLst>
           </p:nvPr>
         </p:nvGraphicFramePr>
         <p:xfrm>
-          <a:off x="2437582" y="3528556"/>
+          <a:off x="2770137" y="3577201"/>
           <a:ext cx="1249680" cy="544326"/>
         </p:xfrm>
         <a:graphic>
@@ -4170,7 +4175,7 @@
         </p:nvSpPr>
         <p:spPr>
           <a:xfrm>
-            <a:off x="2140114" y="3528556"/>
+            <a:off x="2472669" y="3577201"/>
             <a:ext cx="184347" cy="544326"/>
           </a:xfrm>
           <a:prstGeom prst="leftBrace">
@@ -4222,7 +4227,7 @@
         </p:nvSpPr>
         <p:spPr>
           <a:xfrm rot="16200000">
-            <a:off x="2970249" y="3616591"/>
+            <a:off x="3302804" y="3665236"/>
             <a:ext cx="184347" cy="1249681"/>
           </a:xfrm>
           <a:prstGeom prst="leftBrace">
@@ -4277,7 +4282,7 @@
         </p:nvSpPr>
         <p:spPr>
           <a:xfrm>
-            <a:off x="1851900" y="3616053"/>
+            <a:off x="2184455" y="3664698"/>
             <a:ext cx="202842" cy="369332"/>
           </a:xfrm>
           <a:prstGeom prst="rect">
@@ -4354,13 +4359,13 @@
           <p:nvPr>
             <p:extLst>
               <p:ext uri="{D42A27DB-BD31-4B8C-83A1-F6EECF244321}">
-                <p14:modId xmlns:p14="http://schemas.microsoft.com/office/powerpoint/2010/main" val="2453089680"/>
+                <p14:modId xmlns:p14="http://schemas.microsoft.com/office/powerpoint/2010/main" val="2342193873"/>
               </p:ext>
             </p:extLst>
           </p:nvPr>
         </p:nvGraphicFramePr>
         <p:xfrm>
-          <a:off x="6339509" y="4715541"/>
+          <a:off x="5911246" y="4614008"/>
           <a:ext cx="1249680" cy="725768"/>
         </p:xfrm>
         <a:graphic>
@@ -4855,7 +4860,7 @@
         </p:nvSpPr>
         <p:spPr>
           <a:xfrm rot="10800000">
-            <a:off x="7794460" y="4702937"/>
+            <a:off x="7366197" y="4601404"/>
             <a:ext cx="184347" cy="738372"/>
           </a:xfrm>
           <a:prstGeom prst="leftBrace">
@@ -4910,7 +4915,7 @@
         </p:nvSpPr>
         <p:spPr>
           <a:xfrm>
-            <a:off x="8024532" y="4902397"/>
+            <a:off x="7596269" y="4800864"/>
             <a:ext cx="202842" cy="369332"/>
           </a:xfrm>
           <a:prstGeom prst="rect">
@@ -4948,7 +4953,7 @@
         </p:nvSpPr>
         <p:spPr>
           <a:xfrm>
-            <a:off x="5906593" y="4977000"/>
+            <a:off x="5478330" y="4875467"/>
             <a:ext cx="294688" cy="308809"/>
           </a:xfrm>
           <a:prstGeom prst="mathMultiply">
@@ -4994,7 +4999,7 @@
         </p:nvSpPr>
         <p:spPr>
           <a:xfrm rot="16200000">
-            <a:off x="6872176" y="5010174"/>
+            <a:off x="6443913" y="4908641"/>
             <a:ext cx="184347" cy="1249681"/>
           </a:xfrm>
           <a:prstGeom prst="leftBrace">
@@ -5049,7 +5054,7 @@
         </p:nvSpPr>
         <p:spPr>
           <a:xfrm>
-            <a:off x="6821216" y="5662033"/>
+            <a:off x="6392953" y="5560500"/>
             <a:ext cx="202842" cy="369332"/>
           </a:xfrm>
           <a:prstGeom prst="rect">
@@ -5088,13 +5093,13 @@
           <p:nvPr>
             <p:extLst>
               <p:ext uri="{D42A27DB-BD31-4B8C-83A1-F6EECF244321}">
-                <p14:modId xmlns:p14="http://schemas.microsoft.com/office/powerpoint/2010/main" val="867177784"/>
+                <p14:modId xmlns:p14="http://schemas.microsoft.com/office/powerpoint/2010/main" val="4214255293"/>
               </p:ext>
             </p:extLst>
           </p:nvPr>
         </p:nvGraphicFramePr>
         <p:xfrm>
-          <a:off x="2437581" y="2018921"/>
+          <a:off x="2770136" y="2067566"/>
           <a:ext cx="1249680" cy="1088652"/>
         </p:xfrm>
         <a:graphic>
@@ -5801,7 +5806,7 @@
         </p:nvSpPr>
         <p:spPr>
           <a:xfrm rot="5400000">
-            <a:off x="2970247" y="1116922"/>
+            <a:off x="3302802" y="1165567"/>
             <a:ext cx="184347" cy="1249681"/>
           </a:xfrm>
           <a:prstGeom prst="leftBrace">
@@ -5856,7 +5861,7 @@
         </p:nvSpPr>
         <p:spPr>
           <a:xfrm>
-            <a:off x="1994999" y="2017448"/>
+            <a:off x="2327554" y="2066093"/>
             <a:ext cx="184347" cy="1081162"/>
           </a:xfrm>
           <a:prstGeom prst="leftBrace">
@@ -5911,7 +5916,7 @@
         </p:nvSpPr>
         <p:spPr>
           <a:xfrm>
-            <a:off x="1597575" y="2373363"/>
+            <a:off x="1930130" y="2422008"/>
             <a:ext cx="202842" cy="369332"/>
           </a:xfrm>
           <a:prstGeom prst="rect">
@@ -5949,7 +5954,7 @@
         </p:nvSpPr>
         <p:spPr>
           <a:xfrm>
-            <a:off x="2919852" y="1268926"/>
+            <a:off x="3252407" y="1317571"/>
             <a:ext cx="202842" cy="369332"/>
           </a:xfrm>
           <a:prstGeom prst="rect">
@@ -5987,7 +5992,7 @@
         </p:nvSpPr>
         <p:spPr>
           <a:xfrm>
-            <a:off x="2915076" y="3156408"/>
+            <a:off x="3247631" y="3205053"/>
             <a:ext cx="294688" cy="308809"/>
           </a:xfrm>
           <a:prstGeom prst="mathMultiply">
@@ -6048,330 +6053,12 @@
           </a:prstGeom>
         </p:spPr>
       </p:pic>
-      <mc:AlternateContent xmlns:mc="http://schemas.openxmlformats.org/markup-compatibility/2006">
-        <mc:Choice xmlns:a14="http://schemas.microsoft.com/office/drawing/2010/main" Requires="a14">
-          <p:sp>
-            <p:nvSpPr>
-              <p:cNvPr id="34" name="TextBox 33">
-                <a:extLst>
-                  <a:ext uri="{FF2B5EF4-FFF2-40B4-BE49-F238E27FC236}">
-                    <a16:creationId xmlns:a16="http://schemas.microsoft.com/office/drawing/2014/main" id="{D19B18EC-B3ED-7AC5-EFB2-939A73A17609}"/>
-                  </a:ext>
-                </a:extLst>
-              </p:cNvPr>
-              <p:cNvSpPr txBox="1"/>
-              <p:nvPr/>
-            </p:nvSpPr>
-            <p:spPr>
-              <a:xfrm>
-                <a:off x="5443049" y="4187746"/>
-                <a:ext cx="1378167" cy="391582"/>
-              </a:xfrm>
-              <a:prstGeom prst="rect">
-                <a:avLst/>
-              </a:prstGeom>
-              <a:solidFill>
-                <a:schemeClr val="accent2">
-                  <a:lumMod val="20000"/>
-                  <a:lumOff val="80000"/>
-                </a:schemeClr>
-              </a:solidFill>
-            </p:spPr>
-            <p:txBody>
-              <a:bodyPr wrap="square" rtlCol="0">
-                <a:spAutoFit/>
-              </a:bodyPr>
-              <a:lstStyle/>
-              <a:p>
-                <a14:m>
-                  <m:oMathPara xmlns:m="http://schemas.openxmlformats.org/officeDocument/2006/math">
-                    <m:oMathParaPr>
-                      <m:jc m:val="centerGroup"/>
-                    </m:oMathParaPr>
-                    <m:oMath xmlns:m="http://schemas.openxmlformats.org/officeDocument/2006/math">
-                      <m:sSub>
-                        <m:sSubPr>
-                          <m:ctrlPr>
-                            <a:rPr lang="en-US" i="1" dirty="0" smtClean="0">
-                              <a:latin typeface="Cambria Math" panose="02040503050406030204" pitchFamily="18" charset="0"/>
-                              <a:cs typeface="Times New Roman" panose="02020603050405020304" pitchFamily="18" charset="0"/>
-                            </a:rPr>
-                          </m:ctrlPr>
-                        </m:sSubPr>
-                        <m:e>
-                          <m:r>
-                            <a:rPr lang="en-US" b="0" i="1" dirty="0" smtClean="0">
-                              <a:latin typeface="Cambria Math" panose="02040503050406030204" pitchFamily="18" charset="0"/>
-                              <a:cs typeface="Times New Roman" panose="02020603050405020304" pitchFamily="18" charset="0"/>
-                            </a:rPr>
-                            <m:t>𝑊</m:t>
-                          </m:r>
-                        </m:e>
-                        <m:sub>
-                          <m:r>
-                            <a:rPr lang="en-US" b="0" i="1" dirty="0" smtClean="0">
-                              <a:latin typeface="Cambria Math" panose="02040503050406030204" pitchFamily="18" charset="0"/>
-                              <a:cs typeface="Times New Roman" panose="02020603050405020304" pitchFamily="18" charset="0"/>
-                            </a:rPr>
-                            <m:t>𝑥𝑓</m:t>
-                          </m:r>
-                        </m:sub>
-                      </m:sSub>
-                      <m:d>
-                        <m:dPr>
-                          <m:ctrlPr>
-                            <a:rPr lang="en-US" i="1" dirty="0" smtClean="0">
-                              <a:latin typeface="Cambria Math" panose="02040503050406030204" pitchFamily="18" charset="0"/>
-                              <a:cs typeface="Times New Roman" panose="02020603050405020304" pitchFamily="18" charset="0"/>
-                            </a:rPr>
-                          </m:ctrlPr>
-                        </m:dPr>
-                        <m:e>
-                          <m:r>
-                            <a:rPr lang="en-US" i="1" dirty="0" err="1" smtClean="0">
-                              <a:latin typeface="Cambria Math" panose="02040503050406030204" pitchFamily="18" charset="0"/>
-                              <a:cs typeface="Times New Roman" panose="02020603050405020304" pitchFamily="18" charset="0"/>
-                            </a:rPr>
-                            <m:t>𝐵</m:t>
-                          </m:r>
-                          <m:r>
-                            <a:rPr lang="en-US" i="1" dirty="0" smtClean="0">
-                              <a:latin typeface="Cambria Math" panose="02040503050406030204" pitchFamily="18" charset="0"/>
-                              <a:ea typeface="Cambria Math" panose="02040503050406030204" pitchFamily="18" charset="0"/>
-                              <a:cs typeface="Times New Roman" panose="02020603050405020304" pitchFamily="18" charset="0"/>
-                            </a:rPr>
-                            <m:t>×</m:t>
-                          </m:r>
-                          <m:r>
-                            <a:rPr lang="en-US" i="1" dirty="0" err="1" smtClean="0">
-                              <a:latin typeface="Cambria Math" panose="02040503050406030204" pitchFamily="18" charset="0"/>
-                              <a:cs typeface="Times New Roman" panose="02020603050405020304" pitchFamily="18" charset="0"/>
-                            </a:rPr>
-                            <m:t>𝐻</m:t>
-                          </m:r>
-                        </m:e>
-                      </m:d>
-                    </m:oMath>
-                  </m:oMathPara>
-                </a14:m>
-                <a:endParaRPr lang="en-US" dirty="0">
-                  <a:latin typeface="Times New Roman" panose="02020603050405020304" pitchFamily="18" charset="0"/>
-                  <a:cs typeface="Times New Roman" panose="02020603050405020304" pitchFamily="18" charset="0"/>
-                </a:endParaRPr>
-              </a:p>
-            </p:txBody>
-          </p:sp>
-        </mc:Choice>
-        <mc:Fallback>
-          <p:sp>
-            <p:nvSpPr>
-              <p:cNvPr id="34" name="TextBox 33">
-                <a:extLst>
-                  <a:ext uri="{FF2B5EF4-FFF2-40B4-BE49-F238E27FC236}">
-                    <a16:creationId xmlns:a16="http://schemas.microsoft.com/office/drawing/2014/main" id="{D19B18EC-B3ED-7AC5-EFB2-939A73A17609}"/>
-                  </a:ext>
-                </a:extLst>
-              </p:cNvPr>
-              <p:cNvSpPr txBox="1">
-                <a:spLocks noRot="1" noChangeAspect="1" noMove="1" noResize="1" noEditPoints="1" noAdjustHandles="1" noChangeArrowheads="1" noChangeShapeType="1" noTextEdit="1"/>
-              </p:cNvSpPr>
-              <p:nvPr/>
-            </p:nvSpPr>
-            <p:spPr>
-              <a:xfrm>
-                <a:off x="5443049" y="4187746"/>
-                <a:ext cx="1378167" cy="391582"/>
-              </a:xfrm>
-              <a:prstGeom prst="rect">
-                <a:avLst/>
-              </a:prstGeom>
-              <a:blipFill>
-                <a:blip r:embed="rId3"/>
-                <a:stretch>
-                  <a:fillRect b="-9375"/>
-                </a:stretch>
-              </a:blipFill>
-            </p:spPr>
-            <p:txBody>
-              <a:bodyPr/>
-              <a:lstStyle/>
-              <a:p>
-                <a:r>
-                  <a:rPr lang="en-US">
-                    <a:noFill/>
-                  </a:rPr>
-                  <a:t> </a:t>
-                </a:r>
-              </a:p>
-            </p:txBody>
-          </p:sp>
-        </mc:Fallback>
-      </mc:AlternateContent>
-      <mc:AlternateContent xmlns:mc="http://schemas.openxmlformats.org/markup-compatibility/2006">
-        <mc:Choice xmlns:a14="http://schemas.microsoft.com/office/drawing/2010/main" Requires="a14">
-          <p:sp>
-            <p:nvSpPr>
-              <p:cNvPr id="37" name="TextBox 36">
-                <a:extLst>
-                  <a:ext uri="{FF2B5EF4-FFF2-40B4-BE49-F238E27FC236}">
-                    <a16:creationId xmlns:a16="http://schemas.microsoft.com/office/drawing/2014/main" id="{E8F031E1-EC29-3D05-5273-5CE2801A25FC}"/>
-                  </a:ext>
-                </a:extLst>
-              </p:cNvPr>
-              <p:cNvSpPr txBox="1"/>
-              <p:nvPr/>
-            </p:nvSpPr>
-            <p:spPr>
-              <a:xfrm>
-                <a:off x="3897490" y="2818109"/>
-                <a:ext cx="1378167" cy="391582"/>
-              </a:xfrm>
-              <a:prstGeom prst="rect">
-                <a:avLst/>
-              </a:prstGeom>
-              <a:solidFill>
-                <a:schemeClr val="accent2">
-                  <a:lumMod val="20000"/>
-                  <a:lumOff val="80000"/>
-                </a:schemeClr>
-              </a:solidFill>
-            </p:spPr>
-            <p:txBody>
-              <a:bodyPr wrap="square" rtlCol="0">
-                <a:spAutoFit/>
-              </a:bodyPr>
-              <a:lstStyle/>
-              <a:p>
-                <a14:m>
-                  <m:oMathPara xmlns:m="http://schemas.openxmlformats.org/officeDocument/2006/math">
-                    <m:oMathParaPr>
-                      <m:jc m:val="centerGroup"/>
-                    </m:oMathParaPr>
-                    <m:oMath xmlns:m="http://schemas.openxmlformats.org/officeDocument/2006/math">
-                      <m:sSub>
-                        <m:sSubPr>
-                          <m:ctrlPr>
-                            <a:rPr lang="en-US" i="1" dirty="0" smtClean="0">
-                              <a:latin typeface="Cambria Math" panose="02040503050406030204" pitchFamily="18" charset="0"/>
-                              <a:cs typeface="Times New Roman" panose="02020603050405020304" pitchFamily="18" charset="0"/>
-                            </a:rPr>
-                          </m:ctrlPr>
-                        </m:sSubPr>
-                        <m:e>
-                          <m:r>
-                            <a:rPr lang="en-US" b="0" i="1" dirty="0" smtClean="0">
-                              <a:latin typeface="Cambria Math" panose="02040503050406030204" pitchFamily="18" charset="0"/>
-                              <a:cs typeface="Times New Roman" panose="02020603050405020304" pitchFamily="18" charset="0"/>
-                            </a:rPr>
-                            <m:t>𝑊</m:t>
-                          </m:r>
-                        </m:e>
-                        <m:sub>
-                          <m:r>
-                            <a:rPr lang="en-US" b="0" i="1" dirty="0" smtClean="0">
-                              <a:latin typeface="Cambria Math" panose="02040503050406030204" pitchFamily="18" charset="0"/>
-                              <a:cs typeface="Times New Roman" panose="02020603050405020304" pitchFamily="18" charset="0"/>
-                            </a:rPr>
-                            <m:t>h𝑓</m:t>
-                          </m:r>
-                        </m:sub>
-                      </m:sSub>
-                      <m:d>
-                        <m:dPr>
-                          <m:ctrlPr>
-                            <a:rPr lang="en-US" i="1" dirty="0" smtClean="0">
-                              <a:latin typeface="Cambria Math" panose="02040503050406030204" pitchFamily="18" charset="0"/>
-                              <a:cs typeface="Times New Roman" panose="02020603050405020304" pitchFamily="18" charset="0"/>
-                            </a:rPr>
-                          </m:ctrlPr>
-                        </m:dPr>
-                        <m:e>
-                          <m:r>
-                            <a:rPr lang="en-US" i="1" dirty="0" err="1" smtClean="0">
-                              <a:latin typeface="Cambria Math" panose="02040503050406030204" pitchFamily="18" charset="0"/>
-                              <a:cs typeface="Times New Roman" panose="02020603050405020304" pitchFamily="18" charset="0"/>
-                            </a:rPr>
-                            <m:t>𝐵</m:t>
-                          </m:r>
-                          <m:r>
-                            <a:rPr lang="en-US" i="1" dirty="0" smtClean="0">
-                              <a:latin typeface="Cambria Math" panose="02040503050406030204" pitchFamily="18" charset="0"/>
-                              <a:ea typeface="Cambria Math" panose="02040503050406030204" pitchFamily="18" charset="0"/>
-                              <a:cs typeface="Times New Roman" panose="02020603050405020304" pitchFamily="18" charset="0"/>
-                            </a:rPr>
-                            <m:t>×</m:t>
-                          </m:r>
-                          <m:r>
-                            <a:rPr lang="en-US" i="1" dirty="0" err="1" smtClean="0">
-                              <a:latin typeface="Cambria Math" panose="02040503050406030204" pitchFamily="18" charset="0"/>
-                              <a:cs typeface="Times New Roman" panose="02020603050405020304" pitchFamily="18" charset="0"/>
-                            </a:rPr>
-                            <m:t>𝐻</m:t>
-                          </m:r>
-                        </m:e>
-                      </m:d>
-                    </m:oMath>
-                  </m:oMathPara>
-                </a14:m>
-                <a:endParaRPr lang="en-US" dirty="0">
-                  <a:latin typeface="Times New Roman" panose="02020603050405020304" pitchFamily="18" charset="0"/>
-                  <a:cs typeface="Times New Roman" panose="02020603050405020304" pitchFamily="18" charset="0"/>
-                </a:endParaRPr>
-              </a:p>
-            </p:txBody>
-          </p:sp>
-        </mc:Choice>
-        <mc:Fallback>
-          <p:sp>
-            <p:nvSpPr>
-              <p:cNvPr id="37" name="TextBox 36">
-                <a:extLst>
-                  <a:ext uri="{FF2B5EF4-FFF2-40B4-BE49-F238E27FC236}">
-                    <a16:creationId xmlns:a16="http://schemas.microsoft.com/office/drawing/2014/main" id="{E8F031E1-EC29-3D05-5273-5CE2801A25FC}"/>
-                  </a:ext>
-                </a:extLst>
-              </p:cNvPr>
-              <p:cNvSpPr txBox="1">
-                <a:spLocks noRot="1" noChangeAspect="1" noMove="1" noResize="1" noEditPoints="1" noAdjustHandles="1" noChangeArrowheads="1" noChangeShapeType="1" noTextEdit="1"/>
-              </p:cNvSpPr>
-              <p:nvPr/>
-            </p:nvSpPr>
-            <p:spPr>
-              <a:xfrm>
-                <a:off x="3897490" y="2818109"/>
-                <a:ext cx="1378167" cy="391582"/>
-              </a:xfrm>
-              <a:prstGeom prst="rect">
-                <a:avLst/>
-              </a:prstGeom>
-              <a:blipFill>
-                <a:blip r:embed="rId4"/>
-                <a:stretch>
-                  <a:fillRect b="-9375"/>
-                </a:stretch>
-              </a:blipFill>
-            </p:spPr>
-            <p:txBody>
-              <a:bodyPr/>
-              <a:lstStyle/>
-              <a:p>
-                <a:r>
-                  <a:rPr lang="en-US">
-                    <a:noFill/>
-                  </a:rPr>
-                  <a:t> </a:t>
-                </a:r>
-              </a:p>
-            </p:txBody>
-          </p:sp>
-        </mc:Fallback>
-      </mc:AlternateContent>
       <p:pic>
         <p:nvPicPr>
-          <p:cNvPr id="40" name="Picture 39">
-            <a:extLst>
-              <a:ext uri="{FF2B5EF4-FFF2-40B4-BE49-F238E27FC236}">
-                <a16:creationId xmlns:a16="http://schemas.microsoft.com/office/drawing/2014/main" id="{97C39178-CDC3-FFD7-3058-6F3A15E045CB}"/>
+          <p:cNvPr id="44" name="Picture 43">
+            <a:extLst>
+              <a:ext uri="{FF2B5EF4-FFF2-40B4-BE49-F238E27FC236}">
+                <a16:creationId xmlns:a16="http://schemas.microsoft.com/office/drawing/2014/main" id="{2BEE20A3-ACAB-F2F3-CC46-2B0A71523933}"/>
               </a:ext>
             </a:extLst>
           </p:cNvPr>
@@ -6381,224 +6068,27 @@
           <p:nvPr/>
         </p:nvPicPr>
         <p:blipFill>
-          <a:blip r:embed="rId5"/>
+          <a:blip r:embed="rId3"/>
           <a:stretch>
             <a:fillRect/>
           </a:stretch>
         </p:blipFill>
         <p:spPr>
-          <a:xfrm>
-            <a:off x="5361731" y="3501481"/>
-            <a:ext cx="287959" cy="287959"/>
+          <a:xfrm rot="16200000" flipH="1">
+            <a:off x="5004813" y="3429000"/>
+            <a:ext cx="478749" cy="478749"/>
           </a:xfrm>
           <a:prstGeom prst="rect">
             <a:avLst/>
           </a:prstGeom>
+          <a:solidFill>
+            <a:schemeClr val="accent2">
+              <a:lumMod val="20000"/>
+              <a:lumOff val="80000"/>
+            </a:schemeClr>
+          </a:solidFill>
         </p:spPr>
       </p:pic>
-      <mc:AlternateContent xmlns:mc="http://schemas.openxmlformats.org/markup-compatibility/2006">
-        <mc:Choice xmlns:a14="http://schemas.microsoft.com/office/drawing/2010/main" Requires="a14">
-          <p:sp>
-            <p:nvSpPr>
-              <p:cNvPr id="41" name="Rectangle 40">
-                <a:extLst>
-                  <a:ext uri="{FF2B5EF4-FFF2-40B4-BE49-F238E27FC236}">
-                    <a16:creationId xmlns:a16="http://schemas.microsoft.com/office/drawing/2014/main" id="{FD863C06-57D7-0D24-B2E6-51E38D889DA1}"/>
-                  </a:ext>
-                </a:extLst>
-              </p:cNvPr>
-              <p:cNvSpPr/>
-              <p:nvPr/>
-            </p:nvSpPr>
-            <p:spPr>
-              <a:xfrm>
-                <a:off x="5947108" y="3013900"/>
-                <a:ext cx="1586465" cy="510157"/>
-              </a:xfrm>
-              <a:prstGeom prst="rect">
-                <a:avLst/>
-              </a:prstGeom>
-              <a:solidFill>
-                <a:schemeClr val="bg1"/>
-              </a:solidFill>
-              <a:ln w="38100">
-                <a:solidFill>
-                  <a:srgbClr val="C00000"/>
-                </a:solidFill>
-              </a:ln>
-            </p:spPr>
-            <p:style>
-              <a:lnRef idx="2">
-                <a:schemeClr val="accent1">
-                  <a:shade val="50000"/>
-                </a:schemeClr>
-              </a:lnRef>
-              <a:fillRef idx="1">
-                <a:schemeClr val="accent1"/>
-              </a:fillRef>
-              <a:effectRef idx="0">
-                <a:schemeClr val="accent1"/>
-              </a:effectRef>
-              <a:fontRef idx="minor">
-                <a:schemeClr val="lt1"/>
-              </a:fontRef>
-            </p:style>
-            <p:txBody>
-              <a:bodyPr rtlCol="0" anchor="ctr"/>
-              <a:lstStyle/>
-              <a:p>
-                <a:pPr algn="ctr"/>
-                <a14:m>
-                  <m:oMathPara xmlns:m="http://schemas.openxmlformats.org/officeDocument/2006/math">
-                    <m:oMathParaPr>
-                      <m:jc m:val="centerGroup"/>
-                    </m:oMathParaPr>
-                    <m:oMath xmlns:m="http://schemas.openxmlformats.org/officeDocument/2006/math">
-                      <m:sSub>
-                        <m:sSubPr>
-                          <m:ctrlPr>
-                            <a:rPr lang="en-US" sz="2000" b="1" i="1" dirty="0" smtClean="0">
-                              <a:solidFill>
-                                <a:srgbClr val="C00000"/>
-                              </a:solidFill>
-                              <a:latin typeface="Cambria Math" panose="02040503050406030204" pitchFamily="18" charset="0"/>
-                              <a:cs typeface="Times New Roman" panose="02020603050405020304" pitchFamily="18" charset="0"/>
-                            </a:rPr>
-                          </m:ctrlPr>
-                        </m:sSubPr>
-                        <m:e>
-                          <m:r>
-                            <a:rPr lang="en-US" sz="2000" b="1" i="1" dirty="0" smtClean="0">
-                              <a:solidFill>
-                                <a:srgbClr val="C00000"/>
-                              </a:solidFill>
-                              <a:latin typeface="Cambria Math" panose="02040503050406030204" pitchFamily="18" charset="0"/>
-                              <a:cs typeface="Times New Roman" panose="02020603050405020304" pitchFamily="18" charset="0"/>
-                            </a:rPr>
-                            <m:t>𝑾</m:t>
-                          </m:r>
-                        </m:e>
-                        <m:sub>
-                          <m:r>
-                            <a:rPr lang="en-US" sz="2000" b="1" i="1" dirty="0" smtClean="0">
-                              <a:solidFill>
-                                <a:srgbClr val="C00000"/>
-                              </a:solidFill>
-                              <a:latin typeface="Cambria Math" panose="02040503050406030204" pitchFamily="18" charset="0"/>
-                              <a:cs typeface="Times New Roman" panose="02020603050405020304" pitchFamily="18" charset="0"/>
-                            </a:rPr>
-                            <m:t>𝒇</m:t>
-                          </m:r>
-                        </m:sub>
-                      </m:sSub>
-                      <m:d>
-                        <m:dPr>
-                          <m:ctrlPr>
-                            <a:rPr lang="en-US" sz="2000" b="1" i="1" dirty="0" smtClean="0">
-                              <a:solidFill>
-                                <a:srgbClr val="C00000"/>
-                              </a:solidFill>
-                              <a:latin typeface="Cambria Math" panose="02040503050406030204" pitchFamily="18" charset="0"/>
-                              <a:cs typeface="Times New Roman" panose="02020603050405020304" pitchFamily="18" charset="0"/>
-                            </a:rPr>
-                          </m:ctrlPr>
-                        </m:dPr>
-                        <m:e>
-                          <m:r>
-                            <a:rPr lang="en-US" sz="2000" b="1" i="1" dirty="0" err="1" smtClean="0">
-                              <a:solidFill>
-                                <a:srgbClr val="C00000"/>
-                              </a:solidFill>
-                              <a:latin typeface="Cambria Math" panose="02040503050406030204" pitchFamily="18" charset="0"/>
-                              <a:cs typeface="Times New Roman" panose="02020603050405020304" pitchFamily="18" charset="0"/>
-                            </a:rPr>
-                            <m:t>𝑩</m:t>
-                          </m:r>
-                          <m:r>
-                            <a:rPr lang="en-US" sz="2000" b="1" i="1" dirty="0" smtClean="0">
-                              <a:solidFill>
-                                <a:srgbClr val="C00000"/>
-                              </a:solidFill>
-                              <a:latin typeface="Cambria Math" panose="02040503050406030204" pitchFamily="18" charset="0"/>
-                              <a:ea typeface="Cambria Math" panose="02040503050406030204" pitchFamily="18" charset="0"/>
-                              <a:cs typeface="Times New Roman" panose="02020603050405020304" pitchFamily="18" charset="0"/>
-                            </a:rPr>
-                            <m:t>×</m:t>
-                          </m:r>
-                          <m:r>
-                            <a:rPr lang="en-US" sz="2000" b="1" i="1" dirty="0" err="1" smtClean="0">
-                              <a:solidFill>
-                                <a:srgbClr val="C00000"/>
-                              </a:solidFill>
-                              <a:latin typeface="Cambria Math" panose="02040503050406030204" pitchFamily="18" charset="0"/>
-                              <a:cs typeface="Times New Roman" panose="02020603050405020304" pitchFamily="18" charset="0"/>
-                            </a:rPr>
-                            <m:t>𝑯</m:t>
-                          </m:r>
-                        </m:e>
-                      </m:d>
-                    </m:oMath>
-                  </m:oMathPara>
-                </a14:m>
-                <a:endParaRPr lang="en-US" sz="2000" b="1">
-                  <a:solidFill>
-                    <a:srgbClr val="C00000"/>
-                  </a:solidFill>
-                </a:endParaRPr>
-              </a:p>
-            </p:txBody>
-          </p:sp>
-        </mc:Choice>
-        <mc:Fallback>
-          <p:sp>
-            <p:nvSpPr>
-              <p:cNvPr id="41" name="Rectangle 40">
-                <a:extLst>
-                  <a:ext uri="{FF2B5EF4-FFF2-40B4-BE49-F238E27FC236}">
-                    <a16:creationId xmlns:a16="http://schemas.microsoft.com/office/drawing/2014/main" id="{FD863C06-57D7-0D24-B2E6-51E38D889DA1}"/>
-                  </a:ext>
-                </a:extLst>
-              </p:cNvPr>
-              <p:cNvSpPr>
-                <a:spLocks noRot="1" noChangeAspect="1" noMove="1" noResize="1" noEditPoints="1" noAdjustHandles="1" noChangeArrowheads="1" noChangeShapeType="1" noTextEdit="1"/>
-              </p:cNvSpPr>
-              <p:nvPr/>
-            </p:nvSpPr>
-            <p:spPr>
-              <a:xfrm>
-                <a:off x="5947108" y="3013900"/>
-                <a:ext cx="1586465" cy="510157"/>
-              </a:xfrm>
-              <a:prstGeom prst="rect">
-                <a:avLst/>
-              </a:prstGeom>
-              <a:blipFill>
-                <a:blip r:embed="rId6"/>
-                <a:stretch>
-                  <a:fillRect/>
-                </a:stretch>
-              </a:blipFill>
-              <a:ln w="38100">
-                <a:solidFill>
-                  <a:srgbClr val="C00000"/>
-                </a:solidFill>
-              </a:ln>
-            </p:spPr>
-            <p:txBody>
-              <a:bodyPr/>
-              <a:lstStyle/>
-              <a:p>
-                <a:r>
-                  <a:rPr lang="en-US">
-                    <a:noFill/>
-                  </a:rPr>
-                  <a:t> </a:t>
-                </a:r>
-              </a:p>
-            </p:txBody>
-          </p:sp>
-        </mc:Fallback>
-      </mc:AlternateContent>
     </p:spTree>
     <p:extLst>
       <p:ext uri="{BB962C8B-B14F-4D97-AF65-F5344CB8AC3E}">

</xml_diff>